<commit_message>
NLP usecases Readme with Rename Directory
</commit_message>
<xml_diff>
--- a/Projects-master/NLP_usecases/NLP_overview.pptx
+++ b/Projects-master/NLP_usecases/NLP_overview.pptx
@@ -9632,7 +9632,7 @@
           <a:p>
             <a:fld id="{165D0C23-655C-46A5-8097-719F50256FB5}" type="datetimeFigureOut">
               <a:rPr lang="en-US" smtClean="0"/>
-              <a:t>10/3/2021</a:t>
+              <a:t>6/29/2022</a:t>
             </a:fld>
             <a:endParaRPr lang="en-US"/>
           </a:p>
@@ -9830,7 +9830,7 @@
           <a:p>
             <a:fld id="{165D0C23-655C-46A5-8097-719F50256FB5}" type="datetimeFigureOut">
               <a:rPr lang="en-US" smtClean="0"/>
-              <a:t>10/3/2021</a:t>
+              <a:t>6/29/2022</a:t>
             </a:fld>
             <a:endParaRPr lang="en-US"/>
           </a:p>
@@ -10038,7 +10038,7 @@
           <a:p>
             <a:fld id="{165D0C23-655C-46A5-8097-719F50256FB5}" type="datetimeFigureOut">
               <a:rPr lang="en-US" smtClean="0"/>
-              <a:t>10/3/2021</a:t>
+              <a:t>6/29/2022</a:t>
             </a:fld>
             <a:endParaRPr lang="en-US"/>
           </a:p>
@@ -10236,7 +10236,7 @@
           <a:p>
             <a:fld id="{165D0C23-655C-46A5-8097-719F50256FB5}" type="datetimeFigureOut">
               <a:rPr lang="en-US" smtClean="0"/>
-              <a:t>10/3/2021</a:t>
+              <a:t>6/29/2022</a:t>
             </a:fld>
             <a:endParaRPr lang="en-US"/>
           </a:p>
@@ -10511,7 +10511,7 @@
           <a:p>
             <a:fld id="{165D0C23-655C-46A5-8097-719F50256FB5}" type="datetimeFigureOut">
               <a:rPr lang="en-US" smtClean="0"/>
-              <a:t>10/3/2021</a:t>
+              <a:t>6/29/2022</a:t>
             </a:fld>
             <a:endParaRPr lang="en-US"/>
           </a:p>
@@ -10776,7 +10776,7 @@
           <a:p>
             <a:fld id="{165D0C23-655C-46A5-8097-719F50256FB5}" type="datetimeFigureOut">
               <a:rPr lang="en-US" smtClean="0"/>
-              <a:t>10/3/2021</a:t>
+              <a:t>6/29/2022</a:t>
             </a:fld>
             <a:endParaRPr lang="en-US"/>
           </a:p>
@@ -11188,7 +11188,7 @@
           <a:p>
             <a:fld id="{165D0C23-655C-46A5-8097-719F50256FB5}" type="datetimeFigureOut">
               <a:rPr lang="en-US" smtClean="0"/>
-              <a:t>10/3/2021</a:t>
+              <a:t>6/29/2022</a:t>
             </a:fld>
             <a:endParaRPr lang="en-US"/>
           </a:p>
@@ -11329,7 +11329,7 @@
           <a:p>
             <a:fld id="{165D0C23-655C-46A5-8097-719F50256FB5}" type="datetimeFigureOut">
               <a:rPr lang="en-US" smtClean="0"/>
-              <a:t>10/3/2021</a:t>
+              <a:t>6/29/2022</a:t>
             </a:fld>
             <a:endParaRPr lang="en-US"/>
           </a:p>
@@ -11442,7 +11442,7 @@
           <a:p>
             <a:fld id="{165D0C23-655C-46A5-8097-719F50256FB5}" type="datetimeFigureOut">
               <a:rPr lang="en-US" smtClean="0"/>
-              <a:t>10/3/2021</a:t>
+              <a:t>6/29/2022</a:t>
             </a:fld>
             <a:endParaRPr lang="en-US"/>
           </a:p>
@@ -11753,7 +11753,7 @@
           <a:p>
             <a:fld id="{165D0C23-655C-46A5-8097-719F50256FB5}" type="datetimeFigureOut">
               <a:rPr lang="en-US" smtClean="0"/>
-              <a:t>10/3/2021</a:t>
+              <a:t>6/29/2022</a:t>
             </a:fld>
             <a:endParaRPr lang="en-US"/>
           </a:p>
@@ -12041,7 +12041,7 @@
           <a:p>
             <a:fld id="{165D0C23-655C-46A5-8097-719F50256FB5}" type="datetimeFigureOut">
               <a:rPr lang="en-US" smtClean="0"/>
-              <a:t>10/3/2021</a:t>
+              <a:t>6/29/2022</a:t>
             </a:fld>
             <a:endParaRPr lang="en-US"/>
           </a:p>
@@ -12282,7 +12282,7 @@
           <a:p>
             <a:fld id="{165D0C23-655C-46A5-8097-719F50256FB5}" type="datetimeFigureOut">
               <a:rPr lang="en-US" smtClean="0"/>
-              <a:t>10/3/2021</a:t>
+              <a:t>6/29/2022</a:t>
             </a:fld>
             <a:endParaRPr lang="en-US"/>
           </a:p>
@@ -14516,7 +14516,12 @@
             <p:ph idx="1"/>
           </p:nvPr>
         </p:nvSpPr>
-        <p:spPr/>
+        <p:spPr>
+          <a:xfrm>
+            <a:off x="838200" y="1876425"/>
+            <a:ext cx="10515600" cy="4351338"/>
+          </a:xfrm>
+        </p:spPr>
         <p:txBody>
           <a:bodyPr/>
           <a:lstStyle/>

</xml_diff>